<commit_message>
Classes and Interfaces Complete
</commit_message>
<xml_diff>
--- a/PPT/TypeScriptv5.pptx
+++ b/PPT/TypeScriptv5.pptx
@@ -5,7 +5,7 @@
     <p:sldMasterId id="2147483660" r:id="rId1"/>
   </p:sldMasterIdLst>
   <p:notesMasterIdLst>
-    <p:notesMasterId r:id="rId59"/>
+    <p:notesMasterId r:id="rId71"/>
   </p:notesMasterIdLst>
   <p:sldIdLst>
     <p:sldId id="256" r:id="rId2"/>
@@ -64,7 +64,19 @@
     <p:sldId id="412" r:id="rId55"/>
     <p:sldId id="413" r:id="rId56"/>
     <p:sldId id="414" r:id="rId57"/>
-    <p:sldId id="268" r:id="rId58"/>
+    <p:sldId id="415" r:id="rId58"/>
+    <p:sldId id="416" r:id="rId59"/>
+    <p:sldId id="417" r:id="rId60"/>
+    <p:sldId id="418" r:id="rId61"/>
+    <p:sldId id="419" r:id="rId62"/>
+    <p:sldId id="421" r:id="rId63"/>
+    <p:sldId id="422" r:id="rId64"/>
+    <p:sldId id="423" r:id="rId65"/>
+    <p:sldId id="424" r:id="rId66"/>
+    <p:sldId id="425" r:id="rId67"/>
+    <p:sldId id="426" r:id="rId68"/>
+    <p:sldId id="420" r:id="rId69"/>
+    <p:sldId id="268" r:id="rId70"/>
   </p:sldIdLst>
   <p:sldSz cx="12192000" cy="6858000"/>
   <p:notesSz cx="6858000" cy="9144000"/>
@@ -253,7 +265,7 @@
           <a:p>
             <a:fld id="{39CD3BCA-8732-46CA-ADDD-C24F968DBEAF}" type="datetimeFigureOut">
               <a:rPr lang="en-GB" smtClean="0"/>
-              <a:t>08/06/2020</a:t>
+              <a:t>17/06/2020</a:t>
             </a:fld>
             <a:endParaRPr lang="en-GB"/>
           </a:p>
@@ -6429,7 +6441,7 @@
           <a:p>
             <a:fld id="{D4BA8270-C9CF-44CA-BE5A-02C2BDCCEDE4}" type="datetimeFigureOut">
               <a:rPr lang="en-GB" smtClean="0"/>
-              <a:t>08/06/2020</a:t>
+              <a:t>17/06/2020</a:t>
             </a:fld>
             <a:endParaRPr lang="en-GB"/>
           </a:p>
@@ -6680,7 +6692,7 @@
           <a:p>
             <a:fld id="{D4BA8270-C9CF-44CA-BE5A-02C2BDCCEDE4}" type="datetimeFigureOut">
               <a:rPr lang="en-GB" smtClean="0"/>
-              <a:t>08/06/2020</a:t>
+              <a:t>17/06/2020</a:t>
             </a:fld>
             <a:endParaRPr lang="en-GB"/>
           </a:p>
@@ -6994,7 +7006,7 @@
           <a:p>
             <a:fld id="{D4BA8270-C9CF-44CA-BE5A-02C2BDCCEDE4}" type="datetimeFigureOut">
               <a:rPr lang="en-GB" smtClean="0"/>
-              <a:t>08/06/2020</a:t>
+              <a:t>17/06/2020</a:t>
             </a:fld>
             <a:endParaRPr lang="en-GB"/>
           </a:p>
@@ -7335,7 +7347,7 @@
           <a:p>
             <a:fld id="{D4BA8270-C9CF-44CA-BE5A-02C2BDCCEDE4}" type="datetimeFigureOut">
               <a:rPr lang="en-GB" smtClean="0"/>
-              <a:t>08/06/2020</a:t>
+              <a:t>17/06/2020</a:t>
             </a:fld>
             <a:endParaRPr lang="en-GB"/>
           </a:p>
@@ -7649,7 +7661,7 @@
           <a:p>
             <a:fld id="{D4BA8270-C9CF-44CA-BE5A-02C2BDCCEDE4}" type="datetimeFigureOut">
               <a:rPr lang="en-GB" smtClean="0"/>
-              <a:t>08/06/2020</a:t>
+              <a:t>17/06/2020</a:t>
             </a:fld>
             <a:endParaRPr lang="en-GB"/>
           </a:p>
@@ -8042,7 +8054,7 @@
           <a:p>
             <a:fld id="{D4BA8270-C9CF-44CA-BE5A-02C2BDCCEDE4}" type="datetimeFigureOut">
               <a:rPr lang="en-GB" smtClean="0"/>
-              <a:t>08/06/2020</a:t>
+              <a:t>17/06/2020</a:t>
             </a:fld>
             <a:endParaRPr lang="en-GB"/>
           </a:p>
@@ -8212,7 +8224,7 @@
           <a:p>
             <a:fld id="{D4BA8270-C9CF-44CA-BE5A-02C2BDCCEDE4}" type="datetimeFigureOut">
               <a:rPr lang="en-GB" smtClean="0"/>
-              <a:t>08/06/2020</a:t>
+              <a:t>17/06/2020</a:t>
             </a:fld>
             <a:endParaRPr lang="en-GB"/>
           </a:p>
@@ -8392,7 +8404,7 @@
           <a:p>
             <a:fld id="{D4BA8270-C9CF-44CA-BE5A-02C2BDCCEDE4}" type="datetimeFigureOut">
               <a:rPr lang="en-GB" smtClean="0"/>
-              <a:t>08/06/2020</a:t>
+              <a:t>17/06/2020</a:t>
             </a:fld>
             <a:endParaRPr lang="en-GB"/>
           </a:p>
@@ -8568,7 +8580,7 @@
           <a:p>
             <a:fld id="{D4BA8270-C9CF-44CA-BE5A-02C2BDCCEDE4}" type="datetimeFigureOut">
               <a:rPr lang="en-GB" smtClean="0"/>
-              <a:t>08/06/2020</a:t>
+              <a:t>17/06/2020</a:t>
             </a:fld>
             <a:endParaRPr lang="en-GB"/>
           </a:p>
@@ -8815,7 +8827,7 @@
           <a:p>
             <a:fld id="{D4BA8270-C9CF-44CA-BE5A-02C2BDCCEDE4}" type="datetimeFigureOut">
               <a:rPr lang="en-GB" smtClean="0"/>
-              <a:t>08/06/2020</a:t>
+              <a:t>17/06/2020</a:t>
             </a:fld>
             <a:endParaRPr lang="en-GB"/>
           </a:p>
@@ -9047,7 +9059,7 @@
           <a:p>
             <a:fld id="{D4BA8270-C9CF-44CA-BE5A-02C2BDCCEDE4}" type="datetimeFigureOut">
               <a:rPr lang="en-GB" smtClean="0"/>
-              <a:t>08/06/2020</a:t>
+              <a:t>17/06/2020</a:t>
             </a:fld>
             <a:endParaRPr lang="en-GB"/>
           </a:p>
@@ -9421,7 +9433,7 @@
           <a:p>
             <a:fld id="{D4BA8270-C9CF-44CA-BE5A-02C2BDCCEDE4}" type="datetimeFigureOut">
               <a:rPr lang="en-GB" smtClean="0"/>
-              <a:t>08/06/2020</a:t>
+              <a:t>17/06/2020</a:t>
             </a:fld>
             <a:endParaRPr lang="en-GB"/>
           </a:p>
@@ -9544,7 +9556,7 @@
           <a:p>
             <a:fld id="{D4BA8270-C9CF-44CA-BE5A-02C2BDCCEDE4}" type="datetimeFigureOut">
               <a:rPr lang="en-GB" smtClean="0"/>
-              <a:t>08/06/2020</a:t>
+              <a:t>17/06/2020</a:t>
             </a:fld>
             <a:endParaRPr lang="en-GB"/>
           </a:p>
@@ -9639,7 +9651,7 @@
           <a:p>
             <a:fld id="{D4BA8270-C9CF-44CA-BE5A-02C2BDCCEDE4}" type="datetimeFigureOut">
               <a:rPr lang="en-GB" smtClean="0"/>
-              <a:t>08/06/2020</a:t>
+              <a:t>17/06/2020</a:t>
             </a:fld>
             <a:endParaRPr lang="en-GB"/>
           </a:p>
@@ -9894,7 +9906,7 @@
           <a:p>
             <a:fld id="{D4BA8270-C9CF-44CA-BE5A-02C2BDCCEDE4}" type="datetimeFigureOut">
               <a:rPr lang="en-GB" smtClean="0"/>
-              <a:t>08/06/2020</a:t>
+              <a:t>17/06/2020</a:t>
             </a:fld>
             <a:endParaRPr lang="en-GB"/>
           </a:p>
@@ -10157,7 +10169,7 @@
           <a:p>
             <a:fld id="{D4BA8270-C9CF-44CA-BE5A-02C2BDCCEDE4}" type="datetimeFigureOut">
               <a:rPr lang="en-GB" smtClean="0"/>
-              <a:t>08/06/2020</a:t>
+              <a:t>17/06/2020</a:t>
             </a:fld>
             <a:endParaRPr lang="en-GB"/>
           </a:p>
@@ -10900,7 +10912,7 @@
           <a:p>
             <a:fld id="{D4BA8270-C9CF-44CA-BE5A-02C2BDCCEDE4}" type="datetimeFigureOut">
               <a:rPr lang="en-GB" smtClean="0"/>
-              <a:t>08/06/2020</a:t>
+              <a:t>17/06/2020</a:t>
             </a:fld>
             <a:endParaRPr lang="en-GB"/>
           </a:p>
@@ -35353,6 +35365,63 @@
           </a:p>
         </p:txBody>
       </p:sp>
+      <p:graphicFrame>
+        <p:nvGraphicFramePr>
+          <p:cNvPr id="4" name="Object 3"/>
+          <p:cNvGraphicFramePr>
+            <a:graphicFrameLocks noChangeAspect="1"/>
+          </p:cNvGraphicFramePr>
+          <p:nvPr>
+            <p:extLst>
+              <p:ext uri="{D42A27DB-BD31-4B8C-83A1-F6EECF244321}">
+                <p14:modId xmlns:p14="http://schemas.microsoft.com/office/powerpoint/2010/main" val="4257117673"/>
+              </p:ext>
+            </p:extLst>
+          </p:nvPr>
+        </p:nvGraphicFramePr>
+        <p:xfrm>
+          <a:off x="6448423" y="3196882"/>
+          <a:ext cx="3346365" cy="1737583"/>
+        </p:xfrm>
+        <a:graphic>
+          <a:graphicData uri="http://schemas.openxmlformats.org/presentationml/2006/ole">
+            <mc:AlternateContent xmlns:mc="http://schemas.openxmlformats.org/markup-compatibility/2006">
+              <mc:Choice xmlns:v="urn:schemas-microsoft-com:vml" Requires="v">
+                <p:oleObj spid="_x0000_s1037" name="Документ" showAsIcon="1" r:id="rId3" imgW="914400" imgH="792360" progId="Word.Document.12">
+                  <p:embed/>
+                </p:oleObj>
+              </mc:Choice>
+              <mc:Fallback>
+                <p:oleObj name="Документ" showAsIcon="1" r:id="rId3" imgW="914400" imgH="792360" progId="Word.Document.12">
+                  <p:embed/>
+                  <p:pic>
+                    <p:nvPicPr>
+                      <p:cNvPr id="0" name=""/>
+                      <p:cNvPicPr/>
+                      <p:nvPr/>
+                    </p:nvPicPr>
+                    <p:blipFill>
+                      <a:blip r:embed="rId4"/>
+                      <a:stretch>
+                        <a:fillRect/>
+                      </a:stretch>
+                    </p:blipFill>
+                    <p:spPr>
+                      <a:xfrm>
+                        <a:off x="6448423" y="3196882"/>
+                        <a:ext cx="3346365" cy="1737583"/>
+                      </a:xfrm>
+                      <a:prstGeom prst="rect">
+                        <a:avLst/>
+                      </a:prstGeom>
+                    </p:spPr>
+                  </p:pic>
+                </p:oleObj>
+              </mc:Fallback>
+            </mc:AlternateContent>
+          </a:graphicData>
+        </a:graphic>
+      </p:graphicFrame>
     </p:spTree>
     <p:extLst>
       <p:ext uri="{BB962C8B-B14F-4D97-AF65-F5344CB8AC3E}">
@@ -35409,7 +35478,6 @@
               <a:rPr lang="en-GB" dirty="0"/>
               <a:t>Shorthand Initialization</a:t>
             </a:r>
-            <a:endParaRPr lang="en-GB" dirty="0"/>
           </a:p>
         </p:txBody>
       </p:sp>
@@ -35617,6 +35685,34 @@
       </p:grpSpPr>
       <p:sp>
         <p:nvSpPr>
+          <p:cNvPr id="2" name="Title 1"/>
+          <p:cNvSpPr>
+            <a:spLocks noGrp="1"/>
+          </p:cNvSpPr>
+          <p:nvPr>
+            <p:ph type="title"/>
+          </p:nvPr>
+        </p:nvSpPr>
+        <p:spPr>
+          <a:xfrm>
+            <a:off x="677334" y="98854"/>
+            <a:ext cx="8596668" cy="659027"/>
+          </a:xfrm>
+        </p:spPr>
+        <p:txBody>
+          <a:bodyPr/>
+          <a:lstStyle/>
+          <a:p>
+            <a:r>
+              <a:rPr lang="en-GB" dirty="0" smtClean="0"/>
+              <a:t>Inheritance</a:t>
+            </a:r>
+            <a:endParaRPr lang="en-GB" dirty="0"/>
+          </a:p>
+        </p:txBody>
+      </p:sp>
+      <p:sp>
+        <p:nvSpPr>
           <p:cNvPr id="3" name="Content Placeholder 2"/>
           <p:cNvSpPr>
             <a:spLocks noGrp="1"/>
@@ -35627,8 +35723,98 @@
         </p:nvSpPr>
         <p:spPr>
           <a:xfrm>
-            <a:off x="3163860" y="2754147"/>
-            <a:ext cx="8596668" cy="3880773"/>
+            <a:off x="677334" y="963827"/>
+            <a:ext cx="8596668" cy="5077535"/>
+          </a:xfrm>
+        </p:spPr>
+        <p:txBody>
+          <a:bodyPr/>
+          <a:lstStyle/>
+          <a:p>
+            <a:r>
+              <a:rPr lang="en-GB" dirty="0" smtClean="0"/>
+              <a:t>Inheritance is used to implement the specialization relationship in typescript</a:t>
+            </a:r>
+          </a:p>
+          <a:p>
+            <a:r>
+              <a:rPr lang="en-GB" dirty="0" smtClean="0"/>
+              <a:t>Ts supports multi level inheritance does not support multiple inheritance.</a:t>
+            </a:r>
+          </a:p>
+          <a:p>
+            <a:r>
+              <a:rPr lang="en-GB" dirty="0" smtClean="0"/>
+              <a:t>We use extends keyword for inheritance.</a:t>
+            </a:r>
+          </a:p>
+          <a:p>
+            <a:r>
+              <a:rPr lang="en-GB" dirty="0" smtClean="0"/>
+              <a:t>If we don’t specify a constructor in child class parent class constructor is by default inherited and used</a:t>
+            </a:r>
+          </a:p>
+          <a:p>
+            <a:r>
+              <a:rPr lang="en-GB" dirty="0" smtClean="0"/>
+              <a:t>If we although specify a constructor we need to use the super keyword to call the parent class constructor as the first line of our constructor.</a:t>
+            </a:r>
+          </a:p>
+          <a:p>
+            <a:r>
+              <a:rPr lang="en-GB" dirty="0" smtClean="0"/>
+              <a:t>A child class inherits properties/methods from parent class and can also add methods /properties of its own.</a:t>
+            </a:r>
+          </a:p>
+          <a:p>
+            <a:endParaRPr lang="en-GB" dirty="0"/>
+          </a:p>
+        </p:txBody>
+      </p:sp>
+    </p:spTree>
+    <p:extLst>
+      <p:ext uri="{BB962C8B-B14F-4D97-AF65-F5344CB8AC3E}">
+        <p14:creationId xmlns:p14="http://schemas.microsoft.com/office/powerpoint/2010/main" val="281029216"/>
+      </p:ext>
+    </p:extLst>
+  </p:cSld>
+  <p:clrMapOvr>
+    <a:masterClrMapping/>
+  </p:clrMapOvr>
+</p:sld>
+</file>
+
+<file path=ppt/slides/slide58.xml><?xml version="1.0" encoding="utf-8"?>
+<p:sld xmlns:a="http://schemas.openxmlformats.org/drawingml/2006/main" xmlns:r="http://schemas.openxmlformats.org/officeDocument/2006/relationships" xmlns:p="http://schemas.openxmlformats.org/presentationml/2006/main">
+  <p:cSld>
+    <p:spTree>
+      <p:nvGrpSpPr>
+        <p:cNvPr id="1" name=""/>
+        <p:cNvGrpSpPr/>
+        <p:nvPr/>
+      </p:nvGrpSpPr>
+      <p:grpSpPr>
+        <a:xfrm>
+          <a:off x="0" y="0"/>
+          <a:ext cx="0" cy="0"/>
+          <a:chOff x="0" y="0"/>
+          <a:chExt cx="0" cy="0"/>
+        </a:xfrm>
+      </p:grpSpPr>
+      <p:sp>
+        <p:nvSpPr>
+          <p:cNvPr id="2" name="Title 1"/>
+          <p:cNvSpPr>
+            <a:spLocks noGrp="1"/>
+          </p:cNvSpPr>
+          <p:nvPr>
+            <p:ph type="title"/>
+          </p:nvPr>
+        </p:nvSpPr>
+        <p:spPr>
+          <a:xfrm>
+            <a:off x="289254" y="123567"/>
+            <a:ext cx="9372828" cy="510746"/>
           </a:xfrm>
         </p:spPr>
         <p:txBody>
@@ -35637,34 +35823,212 @@
           </a:bodyPr>
           <a:lstStyle/>
           <a:p>
-            <a:pPr marL="0" indent="0">
-              <a:buNone/>
-            </a:pPr>
-            <a:r>
-              <a:rPr lang="en-IN" sz="5400" b="1" smtClean="0"/>
-              <a:t>Thanks!!!!!</a:t>
-            </a:r>
-            <a:endParaRPr lang="en-GB" sz="5400" b="1" dirty="0"/>
+            <a:r>
+              <a:rPr lang="en-IN" sz="1800" dirty="0"/>
+              <a:t>Overriding Properties &amp; The "protected" Modifier</a:t>
+            </a:r>
+            <a:endParaRPr lang="en-GB" sz="1800" dirty="0"/>
+          </a:p>
+        </p:txBody>
+      </p:sp>
+      <p:sp>
+        <p:nvSpPr>
+          <p:cNvPr id="3" name="Content Placeholder 2"/>
+          <p:cNvSpPr>
+            <a:spLocks noGrp="1"/>
+          </p:cNvSpPr>
+          <p:nvPr>
+            <p:ph idx="1"/>
+          </p:nvPr>
+        </p:nvSpPr>
+        <p:spPr>
+          <a:xfrm>
+            <a:off x="677334" y="634313"/>
+            <a:ext cx="9471682" cy="5407049"/>
+          </a:xfrm>
+        </p:spPr>
+        <p:txBody>
+          <a:bodyPr/>
+          <a:lstStyle/>
+          <a:p>
+            <a:r>
+              <a:rPr lang="en-GB" dirty="0" smtClean="0"/>
+              <a:t>Any method of the base class can be overridden in the child class</a:t>
+            </a:r>
+          </a:p>
+          <a:p>
+            <a:r>
+              <a:rPr lang="en-GB" dirty="0" smtClean="0"/>
+              <a:t>Child class has access to public methods and properties of the base class</a:t>
+            </a:r>
+          </a:p>
+          <a:p>
+            <a:r>
+              <a:rPr lang="en-GB" dirty="0" smtClean="0"/>
+              <a:t>Private methods and properties are not accessible to child class.</a:t>
+            </a:r>
+          </a:p>
+          <a:p>
+            <a:r>
+              <a:rPr lang="en-GB" dirty="0" smtClean="0"/>
+              <a:t>We also have another access modifier called protected which works like a private modifier except that protected methods and properties are also accessible to child class</a:t>
+            </a:r>
+            <a:endParaRPr lang="en-GB" dirty="0"/>
           </a:p>
         </p:txBody>
       </p:sp>
     </p:spTree>
     <p:extLst>
       <p:ext uri="{BB962C8B-B14F-4D97-AF65-F5344CB8AC3E}">
-        <p14:creationId xmlns:p14="http://schemas.microsoft.com/office/powerpoint/2010/main" val="3977684842"/>
+        <p14:creationId xmlns:p14="http://schemas.microsoft.com/office/powerpoint/2010/main" val="1362888488"/>
       </p:ext>
     </p:extLst>
   </p:cSld>
   <p:clrMapOvr>
     <a:masterClrMapping/>
   </p:clrMapOvr>
-  <p:timing>
-    <p:tnLst>
-      <p:par>
-        <p:cTn id="1" dur="indefinite" restart="never" nodeType="tmRoot"/>
-      </p:par>
-    </p:tnLst>
-  </p:timing>
+</p:sld>
+</file>
+
+<file path=ppt/slides/slide59.xml><?xml version="1.0" encoding="utf-8"?>
+<p:sld xmlns:a="http://schemas.openxmlformats.org/drawingml/2006/main" xmlns:r="http://schemas.openxmlformats.org/officeDocument/2006/relationships" xmlns:p="http://schemas.openxmlformats.org/presentationml/2006/main">
+  <p:cSld>
+    <p:spTree>
+      <p:nvGrpSpPr>
+        <p:cNvPr id="1" name=""/>
+        <p:cNvGrpSpPr/>
+        <p:nvPr/>
+      </p:nvGrpSpPr>
+      <p:grpSpPr>
+        <a:xfrm>
+          <a:off x="0" y="0"/>
+          <a:ext cx="0" cy="0"/>
+          <a:chOff x="0" y="0"/>
+          <a:chExt cx="0" cy="0"/>
+        </a:xfrm>
+      </p:grpSpPr>
+      <p:sp>
+        <p:nvSpPr>
+          <p:cNvPr id="2" name="Title 1"/>
+          <p:cNvSpPr>
+            <a:spLocks noGrp="1"/>
+          </p:cNvSpPr>
+          <p:nvPr>
+            <p:ph type="title"/>
+          </p:nvPr>
+        </p:nvSpPr>
+        <p:spPr>
+          <a:xfrm>
+            <a:off x="430199" y="98854"/>
+            <a:ext cx="8596668" cy="650789"/>
+          </a:xfrm>
+        </p:spPr>
+        <p:txBody>
+          <a:bodyPr/>
+          <a:lstStyle/>
+          <a:p>
+            <a:r>
+              <a:rPr lang="en-GB" dirty="0"/>
+              <a:t> Getters &amp; Setters</a:t>
+            </a:r>
+          </a:p>
+        </p:txBody>
+      </p:sp>
+      <p:sp>
+        <p:nvSpPr>
+          <p:cNvPr id="3" name="Content Placeholder 2"/>
+          <p:cNvSpPr>
+            <a:spLocks noGrp="1"/>
+          </p:cNvSpPr>
+          <p:nvPr>
+            <p:ph idx="1"/>
+          </p:nvPr>
+        </p:nvSpPr>
+        <p:spPr>
+          <a:xfrm>
+            <a:off x="677334" y="815547"/>
+            <a:ext cx="8596668" cy="5225816"/>
+          </a:xfrm>
+        </p:spPr>
+        <p:txBody>
+          <a:bodyPr/>
+          <a:lstStyle/>
+          <a:p>
+            <a:r>
+              <a:rPr lang="en-GB" dirty="0" smtClean="0"/>
+              <a:t>Getters and setters are like normal methods  they are used to get/set the value of a property.</a:t>
+            </a:r>
+          </a:p>
+          <a:p>
+            <a:r>
+              <a:rPr lang="en-GB" dirty="0" smtClean="0"/>
+              <a:t>So a get method essentially returns a </a:t>
+            </a:r>
+            <a:r>
+              <a:rPr lang="en-GB" dirty="0" err="1" smtClean="0"/>
+              <a:t>value.A</a:t>
+            </a:r>
+            <a:r>
+              <a:rPr lang="en-GB" dirty="0" smtClean="0"/>
+              <a:t> set method sets a property.</a:t>
+            </a:r>
+          </a:p>
+          <a:p>
+            <a:r>
+              <a:rPr lang="en-GB" dirty="0" smtClean="0"/>
+              <a:t>Getters are accessed by name no ().</a:t>
+            </a:r>
+          </a:p>
+          <a:p>
+            <a:r>
+              <a:rPr lang="en-GB" dirty="0" smtClean="0"/>
+              <a:t>A setter is accessed by name and value is set using = sign</a:t>
+            </a:r>
+            <a:endParaRPr lang="en-GB" dirty="0"/>
+          </a:p>
+          <a:p>
+            <a:r>
+              <a:rPr lang="en-GB" dirty="0" smtClean="0"/>
+              <a:t>A getter and setter can have the same name</a:t>
+            </a:r>
+          </a:p>
+          <a:p>
+            <a:r>
+              <a:rPr lang="en-GB" dirty="0" smtClean="0"/>
+              <a:t>A getters returns a value doesn’t take in a parameter</a:t>
+            </a:r>
+          </a:p>
+          <a:p>
+            <a:r>
+              <a:rPr lang="en-GB" dirty="0" smtClean="0"/>
+              <a:t>A setter sets the value to a property and thus essentially takes in a parameter</a:t>
+            </a:r>
+          </a:p>
+          <a:p>
+            <a:r>
+              <a:rPr lang="en-GB" dirty="0" smtClean="0"/>
+              <a:t>We can add logic to getters and setters maybe to sanitize/validate a value before getting or setting.</a:t>
+            </a:r>
+          </a:p>
+          <a:p>
+            <a:r>
+              <a:rPr lang="en-GB" dirty="0" smtClean="0"/>
+              <a:t>By convention getter/setter names should be relatable to the property being get/set.</a:t>
+            </a:r>
+            <a:endParaRPr lang="en-GB" dirty="0"/>
+          </a:p>
+        </p:txBody>
+      </p:sp>
+    </p:spTree>
+    <p:extLst>
+      <p:ext uri="{BB962C8B-B14F-4D97-AF65-F5344CB8AC3E}">
+        <p14:creationId xmlns:p14="http://schemas.microsoft.com/office/powerpoint/2010/main" val="1281138296"/>
+      </p:ext>
+    </p:extLst>
+  </p:cSld>
+  <p:clrMapOvr>
+    <a:masterClrMapping/>
+  </p:clrMapOvr>
 </p:sld>
 </file>
 
@@ -35939,6 +36303,1234 @@
     <p:extLst>
       <p:ext uri="{BB962C8B-B14F-4D97-AF65-F5344CB8AC3E}">
         <p14:creationId xmlns:p14="http://schemas.microsoft.com/office/powerpoint/2010/main" val="3754347386"/>
+      </p:ext>
+    </p:extLst>
+  </p:cSld>
+  <p:clrMapOvr>
+    <a:masterClrMapping/>
+  </p:clrMapOvr>
+  <p:timing>
+    <p:tnLst>
+      <p:par>
+        <p:cTn id="1" dur="indefinite" restart="never" nodeType="tmRoot"/>
+      </p:par>
+    </p:tnLst>
+  </p:timing>
+</p:sld>
+</file>
+
+<file path=ppt/slides/slide60.xml><?xml version="1.0" encoding="utf-8"?>
+<p:sld xmlns:a="http://schemas.openxmlformats.org/drawingml/2006/main" xmlns:r="http://schemas.openxmlformats.org/officeDocument/2006/relationships" xmlns:p="http://schemas.openxmlformats.org/presentationml/2006/main">
+  <p:cSld>
+    <p:spTree>
+      <p:nvGrpSpPr>
+        <p:cNvPr id="1" name=""/>
+        <p:cNvGrpSpPr/>
+        <p:nvPr/>
+      </p:nvGrpSpPr>
+      <p:grpSpPr>
+        <a:xfrm>
+          <a:off x="0" y="0"/>
+          <a:ext cx="0" cy="0"/>
+          <a:chOff x="0" y="0"/>
+          <a:chExt cx="0" cy="0"/>
+        </a:xfrm>
+      </p:grpSpPr>
+      <p:sp>
+        <p:nvSpPr>
+          <p:cNvPr id="2" name="Title 1"/>
+          <p:cNvSpPr>
+            <a:spLocks noGrp="1"/>
+          </p:cNvSpPr>
+          <p:nvPr>
+            <p:ph type="title"/>
+          </p:nvPr>
+        </p:nvSpPr>
+        <p:spPr>
+          <a:xfrm>
+            <a:off x="570242" y="140043"/>
+            <a:ext cx="8596668" cy="683741"/>
+          </a:xfrm>
+        </p:spPr>
+        <p:txBody>
+          <a:bodyPr/>
+          <a:lstStyle/>
+          <a:p>
+            <a:r>
+              <a:rPr lang="en-GB" dirty="0"/>
+              <a:t>Static Methods &amp; Properties</a:t>
+            </a:r>
+          </a:p>
+        </p:txBody>
+      </p:sp>
+      <p:sp>
+        <p:nvSpPr>
+          <p:cNvPr id="3" name="Content Placeholder 2"/>
+          <p:cNvSpPr>
+            <a:spLocks noGrp="1"/>
+          </p:cNvSpPr>
+          <p:nvPr>
+            <p:ph idx="1"/>
+          </p:nvPr>
+        </p:nvSpPr>
+        <p:spPr>
+          <a:xfrm>
+            <a:off x="677334" y="939115"/>
+            <a:ext cx="8596668" cy="5102248"/>
+          </a:xfrm>
+        </p:spPr>
+        <p:txBody>
+          <a:bodyPr/>
+          <a:lstStyle/>
+          <a:p>
+            <a:r>
+              <a:rPr lang="en-GB" dirty="0" smtClean="0"/>
+              <a:t>Static properties and methods are defined with a static keyword.</a:t>
+            </a:r>
+          </a:p>
+          <a:p>
+            <a:r>
+              <a:rPr lang="en-GB" dirty="0" smtClean="0"/>
+              <a:t>They can be accessed without having to instantiate the class.</a:t>
+            </a:r>
+          </a:p>
+          <a:p>
+            <a:r>
+              <a:rPr lang="en-GB" dirty="0" smtClean="0"/>
+              <a:t>They are accessed using </a:t>
+            </a:r>
+            <a:r>
+              <a:rPr lang="en-GB" dirty="0" err="1" smtClean="0"/>
+              <a:t>Classname.propertyName</a:t>
+            </a:r>
+            <a:r>
+              <a:rPr lang="en-GB" dirty="0" smtClean="0"/>
+              <a:t> or </a:t>
+            </a:r>
+            <a:r>
+              <a:rPr lang="en-GB" dirty="0" err="1" smtClean="0"/>
+              <a:t>classname.MehodName</a:t>
+            </a:r>
+            <a:r>
+              <a:rPr lang="en-GB" dirty="0" smtClean="0"/>
+              <a:t>();</a:t>
+            </a:r>
+          </a:p>
+          <a:p>
+            <a:r>
+              <a:rPr lang="en-GB" dirty="0" smtClean="0"/>
+              <a:t>The are usually used to create utility functions or global constants</a:t>
+            </a:r>
+          </a:p>
+          <a:p>
+            <a:r>
+              <a:rPr lang="en-GB" dirty="0" smtClean="0"/>
+              <a:t>From inside the class only static methods have access to static variables declared.</a:t>
+            </a:r>
+          </a:p>
+          <a:p>
+            <a:r>
+              <a:rPr lang="en-GB" dirty="0" smtClean="0"/>
+              <a:t>We cant access them using this keyword</a:t>
+            </a:r>
+          </a:p>
+          <a:p>
+            <a:r>
+              <a:rPr lang="en-GB" dirty="0" smtClean="0"/>
+              <a:t>Non static methods can access them by </a:t>
+            </a:r>
+            <a:r>
+              <a:rPr lang="en-GB" dirty="0" err="1" smtClean="0"/>
+              <a:t>className</a:t>
+            </a:r>
+            <a:endParaRPr lang="en-GB" dirty="0"/>
+          </a:p>
+        </p:txBody>
+      </p:sp>
+    </p:spTree>
+    <p:extLst>
+      <p:ext uri="{BB962C8B-B14F-4D97-AF65-F5344CB8AC3E}">
+        <p14:creationId xmlns:p14="http://schemas.microsoft.com/office/powerpoint/2010/main" val="929207533"/>
+      </p:ext>
+    </p:extLst>
+  </p:cSld>
+  <p:clrMapOvr>
+    <a:masterClrMapping/>
+  </p:clrMapOvr>
+</p:sld>
+</file>
+
+<file path=ppt/slides/slide61.xml><?xml version="1.0" encoding="utf-8"?>
+<p:sld xmlns:a="http://schemas.openxmlformats.org/drawingml/2006/main" xmlns:r="http://schemas.openxmlformats.org/officeDocument/2006/relationships" xmlns:p="http://schemas.openxmlformats.org/presentationml/2006/main">
+  <p:cSld>
+    <p:spTree>
+      <p:nvGrpSpPr>
+        <p:cNvPr id="1" name=""/>
+        <p:cNvGrpSpPr/>
+        <p:nvPr/>
+      </p:nvGrpSpPr>
+      <p:grpSpPr>
+        <a:xfrm>
+          <a:off x="0" y="0"/>
+          <a:ext cx="0" cy="0"/>
+          <a:chOff x="0" y="0"/>
+          <a:chExt cx="0" cy="0"/>
+        </a:xfrm>
+      </p:grpSpPr>
+      <p:sp>
+        <p:nvSpPr>
+          <p:cNvPr id="2" name="Title 1"/>
+          <p:cNvSpPr>
+            <a:spLocks noGrp="1"/>
+          </p:cNvSpPr>
+          <p:nvPr>
+            <p:ph type="title"/>
+          </p:nvPr>
+        </p:nvSpPr>
+        <p:spPr>
+          <a:xfrm>
+            <a:off x="446675" y="82378"/>
+            <a:ext cx="8596668" cy="527222"/>
+          </a:xfrm>
+        </p:spPr>
+        <p:txBody>
+          <a:bodyPr>
+            <a:normAutofit fontScale="90000"/>
+          </a:bodyPr>
+          <a:lstStyle/>
+          <a:p>
+            <a:r>
+              <a:rPr lang="en-IN" dirty="0" smtClean="0"/>
+              <a:t>Abstract classes</a:t>
+            </a:r>
+            <a:endParaRPr lang="en-GB" dirty="0"/>
+          </a:p>
+        </p:txBody>
+      </p:sp>
+      <p:sp>
+        <p:nvSpPr>
+          <p:cNvPr id="3" name="Content Placeholder 2"/>
+          <p:cNvSpPr>
+            <a:spLocks noGrp="1"/>
+          </p:cNvSpPr>
+          <p:nvPr>
+            <p:ph idx="1"/>
+          </p:nvPr>
+        </p:nvSpPr>
+        <p:spPr>
+          <a:xfrm>
+            <a:off x="677334" y="790833"/>
+            <a:ext cx="9092742" cy="5250530"/>
+          </a:xfrm>
+        </p:spPr>
+        <p:txBody>
+          <a:bodyPr/>
+          <a:lstStyle/>
+          <a:p>
+            <a:r>
+              <a:rPr lang="en-IN" dirty="0" smtClean="0"/>
+              <a:t>When we are faced with a situation where we know that a method should exist in a particular class but we also know that every child class will need to override it and no generalized version can be written we can use the concept of abstract classes and methods.</a:t>
+            </a:r>
+          </a:p>
+          <a:p>
+            <a:r>
+              <a:rPr lang="en-IN" dirty="0" smtClean="0"/>
+              <a:t>We can have abstract methods only in abstract classes.</a:t>
+            </a:r>
+          </a:p>
+          <a:p>
+            <a:r>
+              <a:rPr lang="en-IN" dirty="0" smtClean="0"/>
+              <a:t>An abstract method is one that only defines the signature </a:t>
+            </a:r>
+            <a:r>
+              <a:rPr lang="en-IN" dirty="0" err="1" smtClean="0"/>
+              <a:t>ie</a:t>
+            </a:r>
+            <a:r>
+              <a:rPr lang="en-IN" dirty="0" smtClean="0"/>
+              <a:t> only name , parameters and return type  it does not have any body</a:t>
+            </a:r>
+          </a:p>
+          <a:p>
+            <a:r>
+              <a:rPr lang="en-IN" dirty="0" smtClean="0"/>
+              <a:t>Abstract methods can only be present in abstract classes.</a:t>
+            </a:r>
+          </a:p>
+          <a:p>
+            <a:r>
+              <a:rPr lang="en-IN" dirty="0" smtClean="0"/>
+              <a:t>An abstract class/method can be defined with an abstract keyword.</a:t>
+            </a:r>
+          </a:p>
+          <a:p>
+            <a:r>
+              <a:rPr lang="en-IN" dirty="0" smtClean="0"/>
+              <a:t>An abstract class can have abstract as well as non abstract methods</a:t>
+            </a:r>
+          </a:p>
+          <a:p>
+            <a:r>
+              <a:rPr lang="en-IN" dirty="0" smtClean="0"/>
+              <a:t>The child classes are forced to override the abstract </a:t>
+            </a:r>
+            <a:r>
+              <a:rPr lang="en-IN" dirty="0" smtClean="0"/>
+              <a:t>methods</a:t>
+            </a:r>
+          </a:p>
+          <a:p>
+            <a:r>
+              <a:rPr lang="en-IN" dirty="0" smtClean="0"/>
+              <a:t>An abstract class can’t be instantiated</a:t>
+            </a:r>
+            <a:endParaRPr lang="en-IN" dirty="0" smtClean="0"/>
+          </a:p>
+          <a:p>
+            <a:endParaRPr lang="en-GB" dirty="0"/>
+          </a:p>
+        </p:txBody>
+      </p:sp>
+    </p:spTree>
+    <p:extLst>
+      <p:ext uri="{BB962C8B-B14F-4D97-AF65-F5344CB8AC3E}">
+        <p14:creationId xmlns:p14="http://schemas.microsoft.com/office/powerpoint/2010/main" val="3601365544"/>
+      </p:ext>
+    </p:extLst>
+  </p:cSld>
+  <p:clrMapOvr>
+    <a:masterClrMapping/>
+  </p:clrMapOvr>
+</p:sld>
+</file>
+
+<file path=ppt/slides/slide62.xml><?xml version="1.0" encoding="utf-8"?>
+<p:sld xmlns:a="http://schemas.openxmlformats.org/drawingml/2006/main" xmlns:r="http://schemas.openxmlformats.org/officeDocument/2006/relationships" xmlns:p="http://schemas.openxmlformats.org/presentationml/2006/main">
+  <p:cSld>
+    <p:spTree>
+      <p:nvGrpSpPr>
+        <p:cNvPr id="1" name=""/>
+        <p:cNvGrpSpPr/>
+        <p:nvPr/>
+      </p:nvGrpSpPr>
+      <p:grpSpPr>
+        <a:xfrm>
+          <a:off x="0" y="0"/>
+          <a:ext cx="0" cy="0"/>
+          <a:chOff x="0" y="0"/>
+          <a:chExt cx="0" cy="0"/>
+        </a:xfrm>
+      </p:grpSpPr>
+      <p:sp>
+        <p:nvSpPr>
+          <p:cNvPr id="2" name="Title 1"/>
+          <p:cNvSpPr>
+            <a:spLocks noGrp="1"/>
+          </p:cNvSpPr>
+          <p:nvPr>
+            <p:ph type="title"/>
+          </p:nvPr>
+        </p:nvSpPr>
+        <p:spPr>
+          <a:xfrm>
+            <a:off x="150112" y="140042"/>
+            <a:ext cx="8596668" cy="453081"/>
+          </a:xfrm>
+        </p:spPr>
+        <p:txBody>
+          <a:bodyPr>
+            <a:noAutofit/>
+          </a:bodyPr>
+          <a:lstStyle/>
+          <a:p>
+            <a:r>
+              <a:rPr lang="en-GB" sz="2400" dirty="0" smtClean="0"/>
+              <a:t>Singleton and Private constructors</a:t>
+            </a:r>
+            <a:endParaRPr lang="en-GB" sz="2400" dirty="0"/>
+          </a:p>
+        </p:txBody>
+      </p:sp>
+      <p:sp>
+        <p:nvSpPr>
+          <p:cNvPr id="3" name="Content Placeholder 2"/>
+          <p:cNvSpPr>
+            <a:spLocks noGrp="1"/>
+          </p:cNvSpPr>
+          <p:nvPr>
+            <p:ph idx="1"/>
+          </p:nvPr>
+        </p:nvSpPr>
+        <p:spPr>
+          <a:xfrm>
+            <a:off x="677334" y="716693"/>
+            <a:ext cx="8596668" cy="5324670"/>
+          </a:xfrm>
+        </p:spPr>
+        <p:txBody>
+          <a:bodyPr/>
+          <a:lstStyle/>
+          <a:p>
+            <a:r>
+              <a:rPr lang="en-GB" dirty="0" smtClean="0"/>
+              <a:t>Singleton is a design pattern used to ensure that only one instance of a class is present at a time.</a:t>
+            </a:r>
+          </a:p>
+          <a:p>
+            <a:r>
+              <a:rPr lang="en-GB" dirty="0" smtClean="0"/>
+              <a:t>This can be achieved in Ts using static methods and private constructors</a:t>
+            </a:r>
+          </a:p>
+          <a:p>
+            <a:r>
+              <a:rPr lang="en-GB" dirty="0" smtClean="0"/>
+              <a:t>We make the constructor private so  it can’t be called from outside using new keyword </a:t>
+            </a:r>
+          </a:p>
+          <a:p>
+            <a:r>
+              <a:rPr lang="en-GB" dirty="0" smtClean="0"/>
+              <a:t>We move the object creation logic to a static method which always returns the same object</a:t>
+            </a:r>
+            <a:endParaRPr lang="en-GB" dirty="0"/>
+          </a:p>
+        </p:txBody>
+      </p:sp>
+    </p:spTree>
+    <p:extLst>
+      <p:ext uri="{BB962C8B-B14F-4D97-AF65-F5344CB8AC3E}">
+        <p14:creationId xmlns:p14="http://schemas.microsoft.com/office/powerpoint/2010/main" val="268418814"/>
+      </p:ext>
+    </p:extLst>
+  </p:cSld>
+  <p:clrMapOvr>
+    <a:masterClrMapping/>
+  </p:clrMapOvr>
+</p:sld>
+</file>
+
+<file path=ppt/slides/slide63.xml><?xml version="1.0" encoding="utf-8"?>
+<p:sld xmlns:a="http://schemas.openxmlformats.org/drawingml/2006/main" xmlns:r="http://schemas.openxmlformats.org/officeDocument/2006/relationships" xmlns:p="http://schemas.openxmlformats.org/presentationml/2006/main">
+  <p:cSld>
+    <p:spTree>
+      <p:nvGrpSpPr>
+        <p:cNvPr id="1" name=""/>
+        <p:cNvGrpSpPr/>
+        <p:nvPr/>
+      </p:nvGrpSpPr>
+      <p:grpSpPr>
+        <a:xfrm>
+          <a:off x="0" y="0"/>
+          <a:ext cx="0" cy="0"/>
+          <a:chOff x="0" y="0"/>
+          <a:chExt cx="0" cy="0"/>
+        </a:xfrm>
+      </p:grpSpPr>
+      <p:sp>
+        <p:nvSpPr>
+          <p:cNvPr id="2" name="Title 1"/>
+          <p:cNvSpPr>
+            <a:spLocks noGrp="1"/>
+          </p:cNvSpPr>
+          <p:nvPr>
+            <p:ph type="title"/>
+          </p:nvPr>
+        </p:nvSpPr>
+        <p:spPr>
+          <a:xfrm>
+            <a:off x="405485" y="74140"/>
+            <a:ext cx="8596668" cy="461319"/>
+          </a:xfrm>
+        </p:spPr>
+        <p:txBody>
+          <a:bodyPr>
+            <a:normAutofit fontScale="90000"/>
+          </a:bodyPr>
+          <a:lstStyle/>
+          <a:p>
+            <a:r>
+              <a:rPr lang="en-GB" dirty="0" smtClean="0"/>
+              <a:t>Interfaces</a:t>
+            </a:r>
+            <a:endParaRPr lang="en-GB" dirty="0"/>
+          </a:p>
+        </p:txBody>
+      </p:sp>
+      <p:sp>
+        <p:nvSpPr>
+          <p:cNvPr id="3" name="Content Placeholder 2"/>
+          <p:cNvSpPr>
+            <a:spLocks noGrp="1"/>
+          </p:cNvSpPr>
+          <p:nvPr>
+            <p:ph idx="1"/>
+          </p:nvPr>
+        </p:nvSpPr>
+        <p:spPr>
+          <a:xfrm>
+            <a:off x="669096" y="683741"/>
+            <a:ext cx="8596668" cy="5357621"/>
+          </a:xfrm>
+        </p:spPr>
+        <p:txBody>
+          <a:bodyPr/>
+          <a:lstStyle/>
+          <a:p>
+            <a:r>
+              <a:rPr lang="en-GB" dirty="0" smtClean="0"/>
+              <a:t>Interfaces allow us to define the type for an object they can just be used  for type checking they cant be used to instantiate something.</a:t>
+            </a:r>
+          </a:p>
+          <a:p>
+            <a:r>
+              <a:rPr lang="en-GB" dirty="0" smtClean="0"/>
+              <a:t>It only defines structure.</a:t>
+            </a:r>
+          </a:p>
+          <a:p>
+            <a:r>
+              <a:rPr lang="en-GB" dirty="0" smtClean="0"/>
+              <a:t>An interface can have properties with types but we cant assign values to the properties . Properties are separated by ;</a:t>
+            </a:r>
+          </a:p>
+          <a:p>
+            <a:r>
+              <a:rPr lang="en-GB" dirty="0" smtClean="0"/>
+              <a:t>Interfaces can have method signatures not definitions.</a:t>
+            </a:r>
+          </a:p>
+          <a:p>
+            <a:r>
+              <a:rPr lang="en-GB" dirty="0" smtClean="0"/>
+              <a:t>Whenever we use the interface as a type for a variable that variable can only save an object that follows the same structure as defined by the interface.</a:t>
+            </a:r>
+          </a:p>
+          <a:p>
+            <a:r>
+              <a:rPr lang="en-GB" dirty="0" smtClean="0"/>
+              <a:t>An interface can be used to define a structure contract for a class using the implements keyword</a:t>
+            </a:r>
+          </a:p>
+          <a:p>
+            <a:r>
+              <a:rPr lang="en-GB" dirty="0" smtClean="0"/>
+              <a:t>A class can implement multiple interfaces.</a:t>
+            </a:r>
+          </a:p>
+          <a:p>
+            <a:r>
+              <a:rPr lang="en-GB" dirty="0" smtClean="0"/>
+              <a:t>A class that implements an interface must satisfy the contract specified by the interface although it can have additional properties/methods.</a:t>
+            </a:r>
+          </a:p>
+          <a:p>
+            <a:r>
+              <a:rPr lang="en-GB" dirty="0" smtClean="0"/>
+              <a:t>An interface can also be used as a type for a variable which may later on store an object of a class that implements that interface </a:t>
+            </a:r>
+          </a:p>
+          <a:p>
+            <a:endParaRPr lang="en-GB" dirty="0"/>
+          </a:p>
+        </p:txBody>
+      </p:sp>
+    </p:spTree>
+    <p:extLst>
+      <p:ext uri="{BB962C8B-B14F-4D97-AF65-F5344CB8AC3E}">
+        <p14:creationId xmlns:p14="http://schemas.microsoft.com/office/powerpoint/2010/main" val="1610497667"/>
+      </p:ext>
+    </p:extLst>
+  </p:cSld>
+  <p:clrMapOvr>
+    <a:masterClrMapping/>
+  </p:clrMapOvr>
+</p:sld>
+</file>
+
+<file path=ppt/slides/slide64.xml><?xml version="1.0" encoding="utf-8"?>
+<p:sld xmlns:a="http://schemas.openxmlformats.org/drawingml/2006/main" xmlns:r="http://schemas.openxmlformats.org/officeDocument/2006/relationships" xmlns:p="http://schemas.openxmlformats.org/presentationml/2006/main">
+  <p:cSld>
+    <p:spTree>
+      <p:nvGrpSpPr>
+        <p:cNvPr id="1" name=""/>
+        <p:cNvGrpSpPr/>
+        <p:nvPr/>
+      </p:nvGrpSpPr>
+      <p:grpSpPr>
+        <a:xfrm>
+          <a:off x="0" y="0"/>
+          <a:ext cx="0" cy="0"/>
+          <a:chOff x="0" y="0"/>
+          <a:chExt cx="0" cy="0"/>
+        </a:xfrm>
+      </p:grpSpPr>
+      <p:sp>
+        <p:nvSpPr>
+          <p:cNvPr id="2" name="Title 1"/>
+          <p:cNvSpPr>
+            <a:spLocks noGrp="1"/>
+          </p:cNvSpPr>
+          <p:nvPr>
+            <p:ph type="title"/>
+          </p:nvPr>
+        </p:nvSpPr>
+        <p:spPr>
+          <a:xfrm>
+            <a:off x="496102" y="115330"/>
+            <a:ext cx="8596668" cy="609600"/>
+          </a:xfrm>
+        </p:spPr>
+        <p:txBody>
+          <a:bodyPr>
+            <a:normAutofit fontScale="90000"/>
+          </a:bodyPr>
+          <a:lstStyle/>
+          <a:p>
+            <a:r>
+              <a:rPr lang="en-GB" dirty="0" err="1" smtClean="0"/>
+              <a:t>Readonly</a:t>
+            </a:r>
+            <a:r>
+              <a:rPr lang="en-GB" dirty="0" smtClean="0"/>
+              <a:t> Interface properties</a:t>
+            </a:r>
+            <a:endParaRPr lang="en-GB" dirty="0"/>
+          </a:p>
+        </p:txBody>
+      </p:sp>
+      <p:sp>
+        <p:nvSpPr>
+          <p:cNvPr id="3" name="Content Placeholder 2"/>
+          <p:cNvSpPr>
+            <a:spLocks noGrp="1"/>
+          </p:cNvSpPr>
+          <p:nvPr>
+            <p:ph idx="1"/>
+          </p:nvPr>
+        </p:nvSpPr>
+        <p:spPr>
+          <a:xfrm>
+            <a:off x="677334" y="906163"/>
+            <a:ext cx="8596668" cy="5135200"/>
+          </a:xfrm>
+        </p:spPr>
+        <p:txBody>
+          <a:bodyPr/>
+          <a:lstStyle/>
+          <a:p>
+            <a:r>
+              <a:rPr lang="en-GB" dirty="0" smtClean="0"/>
+              <a:t>An interface properties cant have public or private modifiers but they can have </a:t>
+            </a:r>
+            <a:r>
+              <a:rPr lang="en-GB" dirty="0" err="1" smtClean="0"/>
+              <a:t>readonly</a:t>
+            </a:r>
+            <a:r>
+              <a:rPr lang="en-GB" dirty="0" smtClean="0"/>
+              <a:t> modifier</a:t>
+            </a:r>
+          </a:p>
+          <a:p>
+            <a:r>
+              <a:rPr lang="en-GB" dirty="0" smtClean="0"/>
+              <a:t>This forces the </a:t>
+            </a:r>
+            <a:r>
+              <a:rPr lang="en-GB" dirty="0" err="1" smtClean="0"/>
+              <a:t>readonly</a:t>
+            </a:r>
+            <a:r>
+              <a:rPr lang="en-GB" dirty="0" smtClean="0"/>
+              <a:t> behaviour on the property of the implementing class.</a:t>
+            </a:r>
+          </a:p>
+          <a:p>
+            <a:endParaRPr lang="en-GB" dirty="0"/>
+          </a:p>
+        </p:txBody>
+      </p:sp>
+    </p:spTree>
+    <p:extLst>
+      <p:ext uri="{BB962C8B-B14F-4D97-AF65-F5344CB8AC3E}">
+        <p14:creationId xmlns:p14="http://schemas.microsoft.com/office/powerpoint/2010/main" val="253052065"/>
+      </p:ext>
+    </p:extLst>
+  </p:cSld>
+  <p:clrMapOvr>
+    <a:masterClrMapping/>
+  </p:clrMapOvr>
+</p:sld>
+</file>
+
+<file path=ppt/slides/slide65.xml><?xml version="1.0" encoding="utf-8"?>
+<p:sld xmlns:a="http://schemas.openxmlformats.org/drawingml/2006/main" xmlns:r="http://schemas.openxmlformats.org/officeDocument/2006/relationships" xmlns:p="http://schemas.openxmlformats.org/presentationml/2006/main">
+  <p:cSld>
+    <p:spTree>
+      <p:nvGrpSpPr>
+        <p:cNvPr id="1" name=""/>
+        <p:cNvGrpSpPr/>
+        <p:nvPr/>
+      </p:nvGrpSpPr>
+      <p:grpSpPr>
+        <a:xfrm>
+          <a:off x="0" y="0"/>
+          <a:ext cx="0" cy="0"/>
+          <a:chOff x="0" y="0"/>
+          <a:chExt cx="0" cy="0"/>
+        </a:xfrm>
+      </p:grpSpPr>
+      <p:sp>
+        <p:nvSpPr>
+          <p:cNvPr id="2" name="Title 1"/>
+          <p:cNvSpPr>
+            <a:spLocks noGrp="1"/>
+          </p:cNvSpPr>
+          <p:nvPr>
+            <p:ph type="title"/>
+          </p:nvPr>
+        </p:nvSpPr>
+        <p:spPr>
+          <a:xfrm>
+            <a:off x="677334" y="107092"/>
+            <a:ext cx="8596668" cy="560173"/>
+          </a:xfrm>
+        </p:spPr>
+        <p:txBody>
+          <a:bodyPr>
+            <a:normAutofit fontScale="90000"/>
+          </a:bodyPr>
+          <a:lstStyle/>
+          <a:p>
+            <a:r>
+              <a:rPr lang="en-GB" dirty="0" smtClean="0"/>
+              <a:t>Inheritance with Interfaces</a:t>
+            </a:r>
+            <a:endParaRPr lang="en-GB" dirty="0"/>
+          </a:p>
+        </p:txBody>
+      </p:sp>
+      <p:sp>
+        <p:nvSpPr>
+          <p:cNvPr id="3" name="Content Placeholder 2"/>
+          <p:cNvSpPr>
+            <a:spLocks noGrp="1"/>
+          </p:cNvSpPr>
+          <p:nvPr>
+            <p:ph idx="1"/>
+          </p:nvPr>
+        </p:nvSpPr>
+        <p:spPr>
+          <a:xfrm>
+            <a:off x="677334" y="733169"/>
+            <a:ext cx="8596668" cy="5308194"/>
+          </a:xfrm>
+        </p:spPr>
+        <p:txBody>
+          <a:bodyPr/>
+          <a:lstStyle/>
+          <a:p>
+            <a:r>
+              <a:rPr lang="en-GB" dirty="0" smtClean="0"/>
+              <a:t>Inheritance can be used with interfaces.</a:t>
+            </a:r>
+          </a:p>
+          <a:p>
+            <a:r>
+              <a:rPr lang="en-GB" dirty="0" smtClean="0"/>
+              <a:t>An interface can extend from another interface</a:t>
+            </a:r>
+          </a:p>
+          <a:p>
+            <a:r>
+              <a:rPr lang="en-GB" dirty="0" smtClean="0"/>
+              <a:t>The implementing class would then be forced to follow the structure of both interfaces</a:t>
+            </a:r>
+          </a:p>
+          <a:p>
+            <a:r>
+              <a:rPr lang="en-GB" dirty="0" smtClean="0"/>
+              <a:t>Unlike Objects An interface  can extend multiple interfaces.</a:t>
+            </a:r>
+          </a:p>
+          <a:p>
+            <a:endParaRPr lang="en-GB" dirty="0"/>
+          </a:p>
+        </p:txBody>
+      </p:sp>
+    </p:spTree>
+    <p:extLst>
+      <p:ext uri="{BB962C8B-B14F-4D97-AF65-F5344CB8AC3E}">
+        <p14:creationId xmlns:p14="http://schemas.microsoft.com/office/powerpoint/2010/main" val="1195058279"/>
+      </p:ext>
+    </p:extLst>
+  </p:cSld>
+  <p:clrMapOvr>
+    <a:masterClrMapping/>
+  </p:clrMapOvr>
+</p:sld>
+</file>
+
+<file path=ppt/slides/slide66.xml><?xml version="1.0" encoding="utf-8"?>
+<p:sld xmlns:a="http://schemas.openxmlformats.org/drawingml/2006/main" xmlns:r="http://schemas.openxmlformats.org/officeDocument/2006/relationships" xmlns:p="http://schemas.openxmlformats.org/presentationml/2006/main">
+  <p:cSld>
+    <p:spTree>
+      <p:nvGrpSpPr>
+        <p:cNvPr id="1" name=""/>
+        <p:cNvGrpSpPr/>
+        <p:nvPr/>
+      </p:nvGrpSpPr>
+      <p:grpSpPr>
+        <a:xfrm>
+          <a:off x="0" y="0"/>
+          <a:ext cx="0" cy="0"/>
+          <a:chOff x="0" y="0"/>
+          <a:chExt cx="0" cy="0"/>
+        </a:xfrm>
+      </p:grpSpPr>
+      <p:sp>
+        <p:nvSpPr>
+          <p:cNvPr id="2" name="Title 1"/>
+          <p:cNvSpPr>
+            <a:spLocks noGrp="1"/>
+          </p:cNvSpPr>
+          <p:nvPr>
+            <p:ph type="title"/>
+          </p:nvPr>
+        </p:nvSpPr>
+        <p:spPr>
+          <a:xfrm>
+            <a:off x="356059" y="74140"/>
+            <a:ext cx="8596668" cy="551935"/>
+          </a:xfrm>
+        </p:spPr>
+        <p:txBody>
+          <a:bodyPr>
+            <a:normAutofit fontScale="90000"/>
+          </a:bodyPr>
+          <a:lstStyle/>
+          <a:p>
+            <a:r>
+              <a:rPr lang="en-GB" dirty="0" smtClean="0"/>
+              <a:t>Interfaces as Function Types</a:t>
+            </a:r>
+            <a:endParaRPr lang="en-GB" dirty="0"/>
+          </a:p>
+        </p:txBody>
+      </p:sp>
+      <p:sp>
+        <p:nvSpPr>
+          <p:cNvPr id="3" name="Content Placeholder 2"/>
+          <p:cNvSpPr>
+            <a:spLocks noGrp="1"/>
+          </p:cNvSpPr>
+          <p:nvPr>
+            <p:ph idx="1"/>
+          </p:nvPr>
+        </p:nvSpPr>
+        <p:spPr>
+          <a:xfrm>
+            <a:off x="677334" y="1005017"/>
+            <a:ext cx="8596668" cy="5036346"/>
+          </a:xfrm>
+        </p:spPr>
+        <p:txBody>
+          <a:bodyPr/>
+          <a:lstStyle/>
+          <a:p>
+            <a:r>
+              <a:rPr lang="en-GB" dirty="0" smtClean="0"/>
+              <a:t>Interfaces can be used as </a:t>
+            </a:r>
+            <a:r>
+              <a:rPr lang="en-GB" dirty="0" err="1" smtClean="0"/>
+              <a:t>FunctionTypes</a:t>
+            </a:r>
+            <a:r>
+              <a:rPr lang="en-GB" dirty="0" smtClean="0"/>
+              <a:t>.</a:t>
+            </a:r>
+          </a:p>
+          <a:p>
+            <a:r>
+              <a:rPr lang="en-GB" dirty="0" smtClean="0"/>
+              <a:t>We can use interfaces as function types by simply writing an anonymous function signature in interface body.</a:t>
+            </a:r>
+            <a:endParaRPr lang="en-GB" dirty="0"/>
+          </a:p>
+        </p:txBody>
+      </p:sp>
+    </p:spTree>
+    <p:extLst>
+      <p:ext uri="{BB962C8B-B14F-4D97-AF65-F5344CB8AC3E}">
+        <p14:creationId xmlns:p14="http://schemas.microsoft.com/office/powerpoint/2010/main" val="1559934176"/>
+      </p:ext>
+    </p:extLst>
+  </p:cSld>
+  <p:clrMapOvr>
+    <a:masterClrMapping/>
+  </p:clrMapOvr>
+</p:sld>
+</file>
+
+<file path=ppt/slides/slide67.xml><?xml version="1.0" encoding="utf-8"?>
+<p:sld xmlns:a="http://schemas.openxmlformats.org/drawingml/2006/main" xmlns:r="http://schemas.openxmlformats.org/officeDocument/2006/relationships" xmlns:p="http://schemas.openxmlformats.org/presentationml/2006/main">
+  <p:cSld>
+    <p:spTree>
+      <p:nvGrpSpPr>
+        <p:cNvPr id="1" name=""/>
+        <p:cNvGrpSpPr/>
+        <p:nvPr/>
+      </p:nvGrpSpPr>
+      <p:grpSpPr>
+        <a:xfrm>
+          <a:off x="0" y="0"/>
+          <a:ext cx="0" cy="0"/>
+          <a:chOff x="0" y="0"/>
+          <a:chExt cx="0" cy="0"/>
+        </a:xfrm>
+      </p:grpSpPr>
+      <p:sp>
+        <p:nvSpPr>
+          <p:cNvPr id="2" name="Title 1"/>
+          <p:cNvSpPr>
+            <a:spLocks noGrp="1"/>
+          </p:cNvSpPr>
+          <p:nvPr>
+            <p:ph type="title"/>
+          </p:nvPr>
+        </p:nvSpPr>
+        <p:spPr>
+          <a:xfrm>
+            <a:off x="776188" y="164757"/>
+            <a:ext cx="8596668" cy="617838"/>
+          </a:xfrm>
+        </p:spPr>
+        <p:txBody>
+          <a:bodyPr>
+            <a:normAutofit fontScale="90000"/>
+          </a:bodyPr>
+          <a:lstStyle/>
+          <a:p>
+            <a:r>
+              <a:rPr lang="en-GB" dirty="0" smtClean="0"/>
+              <a:t>Optional Parameters and Properties</a:t>
+            </a:r>
+            <a:endParaRPr lang="en-GB" dirty="0"/>
+          </a:p>
+        </p:txBody>
+      </p:sp>
+      <p:sp>
+        <p:nvSpPr>
+          <p:cNvPr id="3" name="Content Placeholder 2"/>
+          <p:cNvSpPr>
+            <a:spLocks noGrp="1"/>
+          </p:cNvSpPr>
+          <p:nvPr>
+            <p:ph idx="1"/>
+          </p:nvPr>
+        </p:nvSpPr>
+        <p:spPr>
+          <a:xfrm>
+            <a:off x="677334" y="922639"/>
+            <a:ext cx="8596668" cy="5118724"/>
+          </a:xfrm>
+        </p:spPr>
+        <p:txBody>
+          <a:bodyPr/>
+          <a:lstStyle/>
+          <a:p>
+            <a:r>
+              <a:rPr lang="en-GB" dirty="0" smtClean="0"/>
+              <a:t>We can specify optional parameters and properties both I classes and interfaces using ? After the property name</a:t>
+            </a:r>
+          </a:p>
+          <a:p>
+            <a:r>
+              <a:rPr lang="en-GB" dirty="0" smtClean="0"/>
+              <a:t>Method parameters can also be optional either by using ? After parameter name in this case its value will be undefined by default or by specifying a default value using = sign</a:t>
+            </a:r>
+          </a:p>
+          <a:p>
+            <a:r>
+              <a:rPr lang="en-GB" dirty="0" smtClean="0"/>
+              <a:t>Methods can also be optional .</a:t>
+            </a:r>
+          </a:p>
+          <a:p>
+            <a:r>
+              <a:rPr lang="en-GB" dirty="0" smtClean="0"/>
+              <a:t>A property defined as optional can be defined either as an optional or a required property in implementing class.</a:t>
+            </a:r>
+          </a:p>
+          <a:p>
+            <a:r>
+              <a:rPr lang="en-GB" dirty="0" smtClean="0"/>
+              <a:t>An optional property can also be skipped in implementing class</a:t>
+            </a:r>
+          </a:p>
+          <a:p>
+            <a:r>
+              <a:rPr lang="en-GB" dirty="0" smtClean="0"/>
+              <a:t>Constructor parameters can also be optional</a:t>
+            </a:r>
+          </a:p>
+          <a:p>
+            <a:r>
+              <a:rPr lang="en-GB" dirty="0" smtClean="0"/>
+              <a:t>In methods </a:t>
+            </a:r>
+            <a:r>
+              <a:rPr lang="en-IN" dirty="0"/>
+              <a:t>A required parameter cannot follow an optional </a:t>
+            </a:r>
+            <a:r>
+              <a:rPr lang="en-IN" dirty="0" smtClean="0"/>
+              <a:t>parameter</a:t>
+            </a:r>
+          </a:p>
+          <a:p>
+            <a:r>
+              <a:rPr lang="en-IN" dirty="0" smtClean="0"/>
+              <a:t>The sequence should be all required followed by all optional</a:t>
+            </a:r>
+            <a:endParaRPr lang="en-GB" dirty="0"/>
+          </a:p>
+        </p:txBody>
+      </p:sp>
+    </p:spTree>
+    <p:extLst>
+      <p:ext uri="{BB962C8B-B14F-4D97-AF65-F5344CB8AC3E}">
+        <p14:creationId xmlns:p14="http://schemas.microsoft.com/office/powerpoint/2010/main" val="3261033157"/>
+      </p:ext>
+    </p:extLst>
+  </p:cSld>
+  <p:clrMapOvr>
+    <a:masterClrMapping/>
+  </p:clrMapOvr>
+</p:sld>
+</file>
+
+<file path=ppt/slides/slide68.xml><?xml version="1.0" encoding="utf-8"?>
+<p:sld xmlns:a="http://schemas.openxmlformats.org/drawingml/2006/main" xmlns:r="http://schemas.openxmlformats.org/officeDocument/2006/relationships" xmlns:p="http://schemas.openxmlformats.org/presentationml/2006/main">
+  <p:cSld>
+    <p:spTree>
+      <p:nvGrpSpPr>
+        <p:cNvPr id="1" name=""/>
+        <p:cNvGrpSpPr/>
+        <p:nvPr/>
+      </p:nvGrpSpPr>
+      <p:grpSpPr>
+        <a:xfrm>
+          <a:off x="0" y="0"/>
+          <a:ext cx="0" cy="0"/>
+          <a:chOff x="0" y="0"/>
+          <a:chExt cx="0" cy="0"/>
+        </a:xfrm>
+      </p:grpSpPr>
+      <p:sp>
+        <p:nvSpPr>
+          <p:cNvPr id="2" name="Title 1"/>
+          <p:cNvSpPr>
+            <a:spLocks noGrp="1"/>
+          </p:cNvSpPr>
+          <p:nvPr>
+            <p:ph type="title"/>
+          </p:nvPr>
+        </p:nvSpPr>
+        <p:spPr>
+          <a:xfrm>
+            <a:off x="677334" y="609600"/>
+            <a:ext cx="8596668" cy="948267"/>
+          </a:xfrm>
+        </p:spPr>
+        <p:txBody>
+          <a:bodyPr/>
+          <a:lstStyle/>
+          <a:p>
+            <a:r>
+              <a:rPr lang="en-IN" dirty="0" smtClean="0"/>
+              <a:t>Useful links</a:t>
+            </a:r>
+            <a:endParaRPr lang="en-GB" dirty="0"/>
+          </a:p>
+        </p:txBody>
+      </p:sp>
+      <p:sp>
+        <p:nvSpPr>
+          <p:cNvPr id="3" name="Content Placeholder 2"/>
+          <p:cNvSpPr>
+            <a:spLocks noGrp="1"/>
+          </p:cNvSpPr>
+          <p:nvPr>
+            <p:ph idx="1"/>
+          </p:nvPr>
+        </p:nvSpPr>
+        <p:spPr>
+          <a:xfrm>
+            <a:off x="677334" y="1557867"/>
+            <a:ext cx="8596668" cy="4483495"/>
+          </a:xfrm>
+        </p:spPr>
+        <p:txBody>
+          <a:bodyPr/>
+          <a:lstStyle/>
+          <a:p>
+            <a:r>
+              <a:rPr lang="en-IN" dirty="0"/>
+              <a:t>These links might also be interesting:</a:t>
+            </a:r>
+          </a:p>
+          <a:p>
+            <a:r>
+              <a:rPr lang="en-IN" smtClean="0"/>
+              <a:t>TS Classes </a:t>
+            </a:r>
+            <a:r>
+              <a:rPr lang="en-IN" dirty="0" smtClean="0"/>
+              <a:t>Docs:</a:t>
+            </a:r>
+            <a:r>
+              <a:rPr lang="en-GB" dirty="0">
+                <a:hlinkClick r:id="rId2"/>
+              </a:rPr>
+              <a:t>https://</a:t>
+            </a:r>
+            <a:r>
+              <a:rPr lang="en-GB" dirty="0" smtClean="0">
+                <a:hlinkClick r:id="rId2"/>
+              </a:rPr>
+              <a:t>www.typescriptlang.org/docs/handbook/classes.html</a:t>
+            </a:r>
+            <a:endParaRPr lang="en-GB" dirty="0" smtClean="0"/>
+          </a:p>
+          <a:p>
+            <a:r>
+              <a:rPr lang="en-IN" dirty="0" smtClean="0"/>
+              <a:t>Compiler </a:t>
+            </a:r>
+            <a:r>
+              <a:rPr lang="en-IN" dirty="0" err="1"/>
+              <a:t>Config</a:t>
+            </a:r>
+            <a:r>
+              <a:rPr lang="en-IN" dirty="0"/>
+              <a:t> Docs: </a:t>
+            </a:r>
+            <a:r>
+              <a:rPr lang="en-IN" dirty="0">
+                <a:hlinkClick r:id="rId3"/>
+              </a:rPr>
+              <a:t>https://www.typescriptlang.org/docs/handbook/compiler-options.html</a:t>
+            </a:r>
+            <a:endParaRPr lang="en-IN" dirty="0"/>
+          </a:p>
+          <a:p>
+            <a:r>
+              <a:rPr lang="en-IN" dirty="0"/>
+              <a:t>VS Code TS Debugging: </a:t>
+            </a:r>
+            <a:r>
+              <a:rPr lang="en-IN" dirty="0">
+                <a:hlinkClick r:id="rId4"/>
+              </a:rPr>
+              <a:t>https://</a:t>
+            </a:r>
+            <a:r>
+              <a:rPr lang="en-IN" dirty="0" smtClean="0">
+                <a:hlinkClick r:id="rId4"/>
+              </a:rPr>
+              <a:t>code.visualstudio.com/docs/typescript/typescript-debugging</a:t>
+            </a:r>
+            <a:endParaRPr lang="en-IN" dirty="0" smtClean="0"/>
+          </a:p>
+          <a:p>
+            <a:r>
+              <a:rPr lang="en-IN" dirty="0"/>
+              <a:t>More on (JS) Classes: </a:t>
+            </a:r>
+            <a:r>
+              <a:rPr lang="en-IN" dirty="0">
+                <a:hlinkClick r:id="rId5"/>
+              </a:rPr>
+              <a:t>https://developer.mozilla.org/en-US/docs/Web/JavaScript/Reference/Classes</a:t>
+            </a:r>
+            <a:endParaRPr lang="en-IN" dirty="0"/>
+          </a:p>
+          <a:p>
+            <a:endParaRPr lang="en-GB" dirty="0"/>
+          </a:p>
+        </p:txBody>
+      </p:sp>
+    </p:spTree>
+    <p:extLst>
+      <p:ext uri="{BB962C8B-B14F-4D97-AF65-F5344CB8AC3E}">
+        <p14:creationId xmlns:p14="http://schemas.microsoft.com/office/powerpoint/2010/main" val="2103898480"/>
+      </p:ext>
+    </p:extLst>
+  </p:cSld>
+  <p:clrMapOvr>
+    <a:masterClrMapping/>
+  </p:clrMapOvr>
+</p:sld>
+</file>
+
+<file path=ppt/slides/slide69.xml><?xml version="1.0" encoding="utf-8"?>
+<p:sld xmlns:a="http://schemas.openxmlformats.org/drawingml/2006/main" xmlns:r="http://schemas.openxmlformats.org/officeDocument/2006/relationships" xmlns:p="http://schemas.openxmlformats.org/presentationml/2006/main">
+  <p:cSld>
+    <p:spTree>
+      <p:nvGrpSpPr>
+        <p:cNvPr id="1" name=""/>
+        <p:cNvGrpSpPr/>
+        <p:nvPr/>
+      </p:nvGrpSpPr>
+      <p:grpSpPr>
+        <a:xfrm>
+          <a:off x="0" y="0"/>
+          <a:ext cx="0" cy="0"/>
+          <a:chOff x="0" y="0"/>
+          <a:chExt cx="0" cy="0"/>
+        </a:xfrm>
+      </p:grpSpPr>
+      <p:sp>
+        <p:nvSpPr>
+          <p:cNvPr id="3" name="Content Placeholder 2"/>
+          <p:cNvSpPr>
+            <a:spLocks noGrp="1"/>
+          </p:cNvSpPr>
+          <p:nvPr>
+            <p:ph idx="1"/>
+          </p:nvPr>
+        </p:nvSpPr>
+        <p:spPr>
+          <a:xfrm>
+            <a:off x="3163860" y="2754147"/>
+            <a:ext cx="8596668" cy="3880773"/>
+          </a:xfrm>
+        </p:spPr>
+        <p:txBody>
+          <a:bodyPr>
+            <a:normAutofit/>
+          </a:bodyPr>
+          <a:lstStyle/>
+          <a:p>
+            <a:pPr marL="0" indent="0">
+              <a:buNone/>
+            </a:pPr>
+            <a:r>
+              <a:rPr lang="en-IN" sz="5400" b="1" smtClean="0"/>
+              <a:t>Thanks!!!!!</a:t>
+            </a:r>
+            <a:endParaRPr lang="en-GB" sz="5400" b="1" dirty="0"/>
+          </a:p>
+        </p:txBody>
+      </p:sp>
+    </p:spTree>
+    <p:extLst>
+      <p:ext uri="{BB962C8B-B14F-4D97-AF65-F5344CB8AC3E}">
+        <p14:creationId xmlns:p14="http://schemas.microsoft.com/office/powerpoint/2010/main" val="3977684842"/>
       </p:ext>
     </p:extLst>
   </p:cSld>

</xml_diff>